<commit_message>
fixed slides title for lecture 22
</commit_message>
<xml_diff>
--- a/docs/lecture_slides/Week 12/Week12_Lecture22_Slides_3_27_2024.pptx
+++ b/docs/lecture_slides/Week 12/Week12_Lecture22_Slides_3_27_2024.pptx
@@ -3379,11 +3379,15 @@
               <a:t>Lecture 22</a:t>
             </a:r>
             <a:br>
-              <a:rPr lang="en-US" dirty="0"/>
+              <a:rPr lang="en-US"/>
             </a:br>
             <a:r>
+              <a:rPr lang="en-US"/>
+              <a:t>Significance </a:t>
+            </a:r>
+            <a:r>
               <a:rPr lang="en-US" dirty="0"/>
-              <a:t>Confidence Level, Critical Value, and Making Decisions</a:t>
+              <a:t>Level, Critical Value, and Making Decisions</a:t>
             </a:r>
             <a:br>
               <a:rPr lang="en-US" dirty="0"/>
@@ -3513,8 +3517,8 @@
           </p:sp>
         </mc:Fallback>
       </mc:AlternateContent>
-      <mc:AlternateContent xmlns:mc="http://schemas.openxmlformats.org/markup-compatibility/2006">
-        <mc:Choice xmlns:a14="http://schemas.microsoft.com/office/drawing/2010/main" Requires="a14">
+      <mc:AlternateContent xmlns:mc="http://schemas.openxmlformats.org/markup-compatibility/2006" xmlns:a14="http://schemas.microsoft.com/office/drawing/2010/main">
+        <mc:Choice Requires="a14">
           <p:sp>
             <p:nvSpPr>
               <p:cNvPr id="3" name="Content Placeholder 2">
@@ -3617,7 +3621,7 @@
             </p:txBody>
           </p:sp>
         </mc:Choice>
-        <mc:Fallback>
+        <mc:Fallback xmlns="">
           <p:sp>
             <p:nvSpPr>
               <p:cNvPr id="3" name="Content Placeholder 2">
@@ -3715,8 +3719,8 @@
           </a:p>
         </p:txBody>
       </p:sp>
-      <mc:AlternateContent xmlns:mc="http://schemas.openxmlformats.org/markup-compatibility/2006">
-        <mc:Choice xmlns:a14="http://schemas.microsoft.com/office/drawing/2010/main" Requires="a14">
+      <mc:AlternateContent xmlns:mc="http://schemas.openxmlformats.org/markup-compatibility/2006" xmlns:a14="http://schemas.microsoft.com/office/drawing/2010/main">
+        <mc:Choice Requires="a14">
           <p:sp>
             <p:nvSpPr>
               <p:cNvPr id="3" name="Content Placeholder 2">
@@ -4557,7 +4561,7 @@
                     <m:sSub>
                       <m:sSubPr>
                         <m:ctrlPr>
-                          <a:rPr lang="en-US" b="0" i="0" smtClean="0">
+                          <a:rPr lang="en-US" b="0" i="1" smtClean="0">
                             <a:latin typeface="Cambria Math" panose="02040503050406030204" pitchFamily="18" charset="0"/>
                           </a:rPr>
                         </m:ctrlPr>
@@ -4628,7 +4632,7 @@
             </p:txBody>
           </p:sp>
         </mc:Choice>
-        <mc:Fallback>
+        <mc:Fallback xmlns="">
           <p:sp>
             <p:nvSpPr>
               <p:cNvPr id="3" name="Content Placeholder 2">
@@ -4702,8 +4706,8 @@
           <a:chExt cx="0" cy="0"/>
         </a:xfrm>
       </p:grpSpPr>
-      <mc:AlternateContent xmlns:mc="http://schemas.openxmlformats.org/markup-compatibility/2006">
-        <mc:Choice xmlns:a14="http://schemas.microsoft.com/office/drawing/2010/main" Requires="a14">
+      <mc:AlternateContent xmlns:mc="http://schemas.openxmlformats.org/markup-compatibility/2006" xmlns:a14="http://schemas.microsoft.com/office/drawing/2010/main">
+        <mc:Choice Requires="a14">
           <p:graphicFrame>
             <p:nvGraphicFramePr>
               <p:cNvPr id="2" name="Table 1">
@@ -5300,7 +5304,6 @@
                           <a:endParaRPr lang="en-US" dirty="0"/>
                         </a:p>
                         <a:p>
-                          <a:pPr/>
                           <a:endParaRPr lang="en-US" dirty="0"/>
                         </a:p>
                         <a:p>
@@ -5749,6 +5752,7 @@
                         <a:bodyPr/>
                         <a:lstStyle/>
                         <a:p>
+                          <a:pPr/>
                           <a14:m>
                             <m:oMathPara xmlns:m="http://schemas.openxmlformats.org/officeDocument/2006/math">
                               <m:oMathParaPr>
@@ -5795,6 +5799,7 @@
                           <a:endParaRPr lang="en-US" b="0" dirty="0"/>
                         </a:p>
                         <a:p>
+                          <a:pPr/>
                           <a14:m>
                             <m:oMathPara xmlns:m="http://schemas.openxmlformats.org/officeDocument/2006/math">
                               <m:oMathParaPr>
@@ -6430,19 +6435,7 @@
                                   <a:rPr lang="en-US" b="0" i="1" smtClean="0">
                                     <a:latin typeface="Cambria Math" panose="02040503050406030204" pitchFamily="18" charset="0"/>
                                   </a:rPr>
-                                  <m:t>|</m:t>
-                                </m:r>
-                                <m:r>
-                                  <a:rPr lang="en-US" b="0" i="1" smtClean="0">
-                                    <a:latin typeface="Cambria Math" panose="02040503050406030204" pitchFamily="18" charset="0"/>
-                                  </a:rPr>
-                                  <m:t>&lt;</m:t>
-                                </m:r>
-                                <m:r>
-                                  <a:rPr lang="en-US" b="0" i="1" smtClean="0">
-                                    <a:latin typeface="Cambria Math" panose="02040503050406030204" pitchFamily="18" charset="0"/>
-                                  </a:rPr>
-                                  <m:t>|</m:t>
+                                  <m:t>|&lt;|</m:t>
                                 </m:r>
                                 <m:r>
                                   <a:rPr lang="en-US" b="0" i="1" smtClean="0">
@@ -6454,13 +6447,7 @@
                                   <a:rPr lang="en-US" b="0" i="1" smtClean="0">
                                     <a:latin typeface="Cambria Math" panose="02040503050406030204" pitchFamily="18" charset="0"/>
                                   </a:rPr>
-                                  <m:t>|</m:t>
-                                </m:r>
-                                <m:r>
-                                  <a:rPr lang="en-US" b="0" i="1" smtClean="0">
-                                    <a:latin typeface="Cambria Math" panose="02040503050406030204" pitchFamily="18" charset="0"/>
-                                  </a:rPr>
-                                  <m:t>&lt; ∞</m:t>
+                                  <m:t>|&lt; ∞</m:t>
                                 </m:r>
                               </m:oMath>
                             </m:oMathPara>
@@ -7082,7 +7069,6 @@
                           <a:endParaRPr lang="en-US" dirty="0"/>
                         </a:p>
                         <a:p>
-                          <a:pPr/>
                           <a:endParaRPr lang="en-US" dirty="0"/>
                         </a:p>
                         <a:p>
@@ -7729,13 +7715,7 @@
                                   <a:rPr lang="en-US" b="0" i="1" smtClean="0">
                                     <a:latin typeface="Cambria Math" panose="02040503050406030204" pitchFamily="18" charset="0"/>
                                   </a:rPr>
-                                  <m:t>&lt;</m:t>
-                                </m:r>
-                                <m:r>
-                                  <a:rPr lang="en-US" b="0" i="1" smtClean="0">
-                                    <a:latin typeface="Cambria Math" panose="02040503050406030204" pitchFamily="18" charset="0"/>
-                                  </a:rPr>
-                                  <m:t>∞</m:t>
+                                  <m:t>&lt;∞</m:t>
                                 </m:r>
                               </m:oMath>
                             </m:oMathPara>
@@ -8332,19 +8312,7 @@
                                   <a:rPr lang="en-US" b="0" i="1" smtClean="0">
                                     <a:latin typeface="Cambria Math" panose="02040503050406030204" pitchFamily="18" charset="0"/>
                                   </a:rPr>
-                                  <m:t>|</m:t>
-                                </m:r>
-                                <m:r>
-                                  <a:rPr lang="en-US" b="0" i="1" smtClean="0">
-                                    <a:latin typeface="Cambria Math" panose="02040503050406030204" pitchFamily="18" charset="0"/>
-                                  </a:rPr>
-                                  <m:t>&lt;</m:t>
-                                </m:r>
-                                <m:r>
-                                  <a:rPr lang="en-US" b="0" i="1" smtClean="0">
-                                    <a:latin typeface="Cambria Math" panose="02040503050406030204" pitchFamily="18" charset="0"/>
-                                  </a:rPr>
-                                  <m:t>|</m:t>
+                                  <m:t>|&lt;|</m:t>
                                 </m:r>
                                 <m:r>
                                   <a:rPr lang="en-US" b="0" i="1" smtClean="0">
@@ -8543,7 +8511,7 @@
             </a:graphic>
           </p:graphicFrame>
         </mc:Choice>
-        <mc:Fallback>
+        <mc:Fallback xmlns="">
           <p:graphicFrame>
             <p:nvGraphicFramePr>
               <p:cNvPr id="2" name="Table 1">
@@ -10193,8 +10161,8 @@
           </a:fontRef>
         </p:style>
       </p:cxnSp>
-      <mc:AlternateContent xmlns:mc="http://schemas.openxmlformats.org/markup-compatibility/2006">
-        <mc:Choice xmlns:a14="http://schemas.microsoft.com/office/drawing/2010/main" Requires="a14">
+      <mc:AlternateContent xmlns:mc="http://schemas.openxmlformats.org/markup-compatibility/2006" xmlns:a14="http://schemas.microsoft.com/office/drawing/2010/main">
+        <mc:Choice Requires="a14">
           <p:sp>
             <p:nvSpPr>
               <p:cNvPr id="7" name="TextBox 6">
@@ -10275,7 +10243,7 @@
             </p:txBody>
           </p:sp>
         </mc:Choice>
-        <mc:Fallback>
+        <mc:Fallback xmlns="">
           <p:sp>
             <p:nvSpPr>
               <p:cNvPr id="7" name="TextBox 6">
@@ -10362,8 +10330,8 @@
           </a:fontRef>
         </p:style>
       </p:cxnSp>
-      <mc:AlternateContent xmlns:mc="http://schemas.openxmlformats.org/markup-compatibility/2006">
-        <mc:Choice xmlns:a14="http://schemas.microsoft.com/office/drawing/2010/main" Requires="a14">
+      <mc:AlternateContent xmlns:mc="http://schemas.openxmlformats.org/markup-compatibility/2006" xmlns:a14="http://schemas.microsoft.com/office/drawing/2010/main">
+        <mc:Choice Requires="a14">
           <p:sp>
             <p:nvSpPr>
               <p:cNvPr id="11" name="TextBox 10">
@@ -10479,7 +10447,7 @@
             </p:txBody>
           </p:sp>
         </mc:Choice>
-        <mc:Fallback>
+        <mc:Fallback xmlns="">
           <p:sp>
             <p:nvSpPr>
               <p:cNvPr id="11" name="TextBox 10">
@@ -10524,8 +10492,8 @@
           </p:sp>
         </mc:Fallback>
       </mc:AlternateContent>
-      <mc:AlternateContent xmlns:mc="http://schemas.openxmlformats.org/markup-compatibility/2006">
-        <mc:Choice xmlns:a14="http://schemas.microsoft.com/office/drawing/2010/main" Requires="a14">
+      <mc:AlternateContent xmlns:mc="http://schemas.openxmlformats.org/markup-compatibility/2006" xmlns:a14="http://schemas.microsoft.com/office/drawing/2010/main">
+        <mc:Choice Requires="a14">
           <p:sp>
             <p:nvSpPr>
               <p:cNvPr id="13" name="TextBox 12">
@@ -10617,7 +10585,7 @@
             </p:txBody>
           </p:sp>
         </mc:Choice>
-        <mc:Fallback>
+        <mc:Fallback xmlns="">
           <p:sp>
             <p:nvSpPr>
               <p:cNvPr id="13" name="TextBox 12">
@@ -10662,8 +10630,8 @@
           </p:sp>
         </mc:Fallback>
       </mc:AlternateContent>
-      <mc:AlternateContent xmlns:mc="http://schemas.openxmlformats.org/markup-compatibility/2006">
-        <mc:Choice xmlns:a14="http://schemas.microsoft.com/office/drawing/2010/main" Requires="a14">
+      <mc:AlternateContent xmlns:mc="http://schemas.openxmlformats.org/markup-compatibility/2006" xmlns:a14="http://schemas.microsoft.com/office/drawing/2010/main">
+        <mc:Choice Requires="a14">
           <p:sp>
             <p:nvSpPr>
               <p:cNvPr id="14" name="TextBox 13">
@@ -10925,7 +10893,7 @@
             </p:txBody>
           </p:sp>
         </mc:Choice>
-        <mc:Fallback>
+        <mc:Fallback xmlns="">
           <p:sp>
             <p:nvSpPr>
               <p:cNvPr id="14" name="TextBox 13">
@@ -12170,8 +12138,8 @@
           </a:fontRef>
         </p:style>
       </p:cxnSp>
-      <mc:AlternateContent xmlns:mc="http://schemas.openxmlformats.org/markup-compatibility/2006">
-        <mc:Choice xmlns:a14="http://schemas.microsoft.com/office/drawing/2010/main" Requires="a14">
+      <mc:AlternateContent xmlns:mc="http://schemas.openxmlformats.org/markup-compatibility/2006" xmlns:a14="http://schemas.microsoft.com/office/drawing/2010/main">
+        <mc:Choice Requires="a14">
           <p:sp>
             <p:nvSpPr>
               <p:cNvPr id="13" name="TextBox 12">
@@ -12252,7 +12220,7 @@
             </p:txBody>
           </p:sp>
         </mc:Choice>
-        <mc:Fallback>
+        <mc:Fallback xmlns="">
           <p:sp>
             <p:nvSpPr>
               <p:cNvPr id="13" name="TextBox 12">
@@ -12341,8 +12309,8 @@
           </a:fontRef>
         </p:style>
       </p:cxnSp>
-      <mc:AlternateContent xmlns:mc="http://schemas.openxmlformats.org/markup-compatibility/2006">
-        <mc:Choice xmlns:a14="http://schemas.microsoft.com/office/drawing/2010/main" Requires="a14">
+      <mc:AlternateContent xmlns:mc="http://schemas.openxmlformats.org/markup-compatibility/2006" xmlns:a14="http://schemas.microsoft.com/office/drawing/2010/main">
+        <mc:Choice Requires="a14">
           <p:sp>
             <p:nvSpPr>
               <p:cNvPr id="16" name="TextBox 15">
@@ -12435,7 +12403,7 @@
             </p:txBody>
           </p:sp>
         </mc:Choice>
-        <mc:Fallback>
+        <mc:Fallback xmlns="">
           <p:sp>
             <p:nvSpPr>
               <p:cNvPr id="16" name="TextBox 15">
@@ -12568,8 +12536,8 @@
           </a:fontRef>
         </p:style>
       </p:cxnSp>
-      <mc:AlternateContent xmlns:mc="http://schemas.openxmlformats.org/markup-compatibility/2006">
-        <mc:Choice xmlns:a14="http://schemas.microsoft.com/office/drawing/2010/main" Requires="a14">
+      <mc:AlternateContent xmlns:mc="http://schemas.openxmlformats.org/markup-compatibility/2006" xmlns:a14="http://schemas.microsoft.com/office/drawing/2010/main">
+        <mc:Choice Requires="a14">
           <p:sp>
             <p:nvSpPr>
               <p:cNvPr id="21" name="TextBox 20">
@@ -12697,7 +12665,7 @@
             </p:txBody>
           </p:sp>
         </mc:Choice>
-        <mc:Fallback>
+        <mc:Fallback xmlns="">
           <p:sp>
             <p:nvSpPr>
               <p:cNvPr id="21" name="TextBox 20">
@@ -12742,8 +12710,8 @@
           </p:sp>
         </mc:Fallback>
       </mc:AlternateContent>
-      <mc:AlternateContent xmlns:mc="http://schemas.openxmlformats.org/markup-compatibility/2006">
-        <mc:Choice xmlns:a14="http://schemas.microsoft.com/office/drawing/2010/main" Requires="a14">
+      <mc:AlternateContent xmlns:mc="http://schemas.openxmlformats.org/markup-compatibility/2006" xmlns:a14="http://schemas.microsoft.com/office/drawing/2010/main">
+        <mc:Choice Requires="a14">
           <p:sp>
             <p:nvSpPr>
               <p:cNvPr id="23" name="TextBox 22">
@@ -12911,7 +12879,7 @@
             </p:txBody>
           </p:sp>
         </mc:Choice>
-        <mc:Fallback>
+        <mc:Fallback xmlns="">
           <p:sp>
             <p:nvSpPr>
               <p:cNvPr id="23" name="TextBox 22">

</xml_diff>